<commit_message>
Few updates at the end
</commit_message>
<xml_diff>
--- a/Exceptional Exceptions.pptx
+++ b/Exceptional Exceptions.pptx
@@ -45,12 +45,14 @@
     <p:sldId id="310" r:id="rId39"/>
     <p:sldId id="296" r:id="rId40"/>
     <p:sldId id="291" r:id="rId41"/>
-    <p:sldId id="297" r:id="rId42"/>
-    <p:sldId id="299" r:id="rId43"/>
-    <p:sldId id="300" r:id="rId44"/>
-    <p:sldId id="298" r:id="rId45"/>
-    <p:sldId id="262" r:id="rId46"/>
-    <p:sldId id="265" r:id="rId47"/>
+    <p:sldId id="311" r:id="rId42"/>
+    <p:sldId id="312" r:id="rId43"/>
+    <p:sldId id="297" r:id="rId44"/>
+    <p:sldId id="299" r:id="rId45"/>
+    <p:sldId id="300" r:id="rId46"/>
+    <p:sldId id="298" r:id="rId47"/>
+    <p:sldId id="262" r:id="rId48"/>
+    <p:sldId id="265" r:id="rId49"/>
   </p:sldIdLst>
   <p:sldSz cx="12192000" cy="6858000"/>
   <p:notesSz cx="6858000" cy="9144000"/>
@@ -151,7 +153,7 @@
   </p:defaultTextStyle>
   <p:extLst>
     <p:ext uri="{EFAFB233-063F-42B5-8137-9DF3F51BA10A}">
-      <p15:sldGuideLst xmlns:p15="http://schemas.microsoft.com/office/powerpoint/2012/main" xmlns="">
+      <p15:sldGuideLst xmlns:p15="http://schemas.microsoft.com/office/powerpoint/2012/main">
         <p15:guide id="1" orient="horz" pos="2160">
           <p15:clr>
             <a:srgbClr val="A4A3A4"/>
@@ -394,7 +396,7 @@
           <a:p>
             <a:fld id="{96DFF08F-DC6B-4601-B491-B0F83F6DD2DA}" type="datetimeFigureOut">
               <a:rPr lang="en-US" dirty="0"/>
-              <a:t>7/12/14</a:t>
+              <a:t>7/13/2014</a:t>
             </a:fld>
             <a:endParaRPr lang="en-US" dirty="0"/>
           </a:p>
@@ -597,7 +599,7 @@
           <a:p>
             <a:fld id="{96DFF08F-DC6B-4601-B491-B0F83F6DD2DA}" type="datetimeFigureOut">
               <a:rPr lang="en-US" dirty="0"/>
-              <a:t>7/12/14</a:t>
+              <a:t>7/13/2014</a:t>
             </a:fld>
             <a:endParaRPr lang="en-US" dirty="0"/>
           </a:p>
@@ -848,7 +850,7 @@
           <a:p>
             <a:fld id="{96DFF08F-DC6B-4601-B491-B0F83F6DD2DA}" type="datetimeFigureOut">
               <a:rPr lang="en-US" dirty="0"/>
-              <a:t>7/12/14</a:t>
+              <a:t>7/13/2014</a:t>
             </a:fld>
             <a:endParaRPr lang="en-US" dirty="0"/>
           </a:p>
@@ -934,7 +936,7 @@
   <p:timing>
     <p:tnLst>
       <p:par>
-        <p:cTn xmlns:p14="http://schemas.microsoft.com/office/powerpoint/2010/main" id="1" dur="indefinite" restart="never" nodeType="tmRoot"/>
+        <p:cTn id="1" dur="indefinite" restart="never" nodeType="tmRoot"/>
       </p:par>
     </p:tnLst>
   </p:timing>
@@ -1050,7 +1052,7 @@
           <a:p>
             <a:fld id="{D62CEF3B-A037-46D0-B02C-1428F07E9383}" type="datetimeFigureOut">
               <a:rPr lang="en-US" dirty="0"/>
-              <a:t>7/12/14</a:t>
+              <a:t>7/13/2014</a:t>
             </a:fld>
             <a:endParaRPr lang="en-US" dirty="0"/>
           </a:p>
@@ -1388,7 +1390,7 @@
           <a:p>
             <a:fld id="{96DFF08F-DC6B-4601-B491-B0F83F6DD2DA}" type="datetimeFigureOut">
               <a:rPr lang="en-US" dirty="0"/>
-              <a:t>7/12/14</a:t>
+              <a:t>7/13/2014</a:t>
             </a:fld>
             <a:endParaRPr lang="en-US" dirty="0"/>
           </a:p>
@@ -1658,7 +1660,7 @@
           <a:p>
             <a:fld id="{96DFF08F-DC6B-4601-B491-B0F83F6DD2DA}" type="datetimeFigureOut">
               <a:rPr lang="en-US" dirty="0"/>
-              <a:t>7/12/14</a:t>
+              <a:t>7/13/2014</a:t>
             </a:fld>
             <a:endParaRPr lang="en-US" dirty="0"/>
           </a:p>
@@ -2032,7 +2034,7 @@
           <a:p>
             <a:fld id="{96DFF08F-DC6B-4601-B491-B0F83F6DD2DA}" type="datetimeFigureOut">
               <a:rPr lang="en-US" dirty="0"/>
-              <a:t>7/12/14</a:t>
+              <a:t>7/13/2014</a:t>
             </a:fld>
             <a:endParaRPr lang="en-US" dirty="0"/>
           </a:p>
@@ -2145,7 +2147,7 @@
           <a:p>
             <a:fld id="{96DFF08F-DC6B-4601-B491-B0F83F6DD2DA}" type="datetimeFigureOut">
               <a:rPr lang="en-US" dirty="0"/>
-              <a:t>7/12/14</a:t>
+              <a:t>7/13/2014</a:t>
             </a:fld>
             <a:endParaRPr lang="en-US" dirty="0"/>
           </a:p>
@@ -2312,7 +2314,7 @@
             <a:fld id="{96DFF08F-DC6B-4601-B491-B0F83F6DD2DA}" type="datetimeFigureOut">
               <a:rPr lang="en-US" dirty="0"/>
               <a:pPr/>
-              <a:t>7/12/14</a:t>
+              <a:t>7/13/2014</a:t>
             </a:fld>
             <a:endParaRPr lang="en-US" dirty="0"/>
           </a:p>
@@ -2663,7 +2665,7 @@
             <a:fld id="{96DFF08F-DC6B-4601-B491-B0F83F6DD2DA}" type="datetimeFigureOut">
               <a:rPr lang="en-US" dirty="0"/>
               <a:pPr/>
-              <a:t>7/12/14</a:t>
+              <a:t>7/13/2014</a:t>
             </a:fld>
             <a:endParaRPr lang="en-US" dirty="0"/>
           </a:p>
@@ -3036,7 +3038,7 @@
           <a:p>
             <a:fld id="{96DFF08F-DC6B-4601-B491-B0F83F6DD2DA}" type="datetimeFigureOut">
               <a:rPr lang="en-US" dirty="0"/>
-              <a:t>7/12/14</a:t>
+              <a:t>7/13/2014</a:t>
             </a:fld>
             <a:endParaRPr lang="en-US" dirty="0"/>
           </a:p>
@@ -3319,7 +3321,7 @@
             <a:fld id="{96DFF08F-DC6B-4601-B491-B0F83F6DD2DA}" type="datetimeFigureOut">
               <a:rPr lang="en-US" dirty="0"/>
               <a:pPr/>
-              <a:t>7/12/14</a:t>
+              <a:t>7/13/2014</a:t>
             </a:fld>
             <a:endParaRPr lang="en-US" dirty="0"/>
           </a:p>
@@ -3919,7 +3921,7 @@
   <p:timing>
     <p:tnLst>
       <p:par>
-        <p:cTn xmlns:p14="http://schemas.microsoft.com/office/powerpoint/2010/main" id="1" dur="indefinite" restart="never" nodeType="tmRoot"/>
+        <p:cTn id="1" dur="indefinite" restart="never" nodeType="tmRoot"/>
       </p:par>
     </p:tnLst>
   </p:timing>
@@ -4105,7 +4107,7 @@
   <p:timing>
     <p:tnLst>
       <p:par>
-        <p:cTn xmlns:p14="http://schemas.microsoft.com/office/powerpoint/2010/main" id="1" dur="indefinite" restart="never" nodeType="tmRoot"/>
+        <p:cTn id="1" dur="indefinite" restart="never" nodeType="tmRoot"/>
       </p:par>
     </p:tnLst>
   </p:timing>
@@ -4192,7 +4194,7 @@
   <p:timing>
     <p:tnLst>
       <p:par>
-        <p:cTn xmlns:p14="http://schemas.microsoft.com/office/powerpoint/2010/main" id="1" dur="indefinite" restart="never" nodeType="tmRoot"/>
+        <p:cTn id="1" dur="indefinite" restart="never" nodeType="tmRoot"/>
       </p:par>
     </p:tnLst>
   </p:timing>
@@ -5730,7 +5732,7 @@
   <p:timing>
     <p:tnLst>
       <p:par>
-        <p:cTn xmlns:p14="http://schemas.microsoft.com/office/powerpoint/2010/main" id="1" dur="indefinite" restart="never" nodeType="tmRoot">
+        <p:cTn id="1" dur="indefinite" restart="never" nodeType="tmRoot">
           <p:childTnLst>
             <p:seq concurrent="1" nextAc="seek">
               <p:cTn id="2" dur="indefinite" nodeType="mainSeq">
@@ -6975,7 +6977,7 @@
   <p:timing>
     <p:tnLst>
       <p:par>
-        <p:cTn xmlns:p14="http://schemas.microsoft.com/office/powerpoint/2010/main" id="1" dur="indefinite" restart="never" nodeType="tmRoot">
+        <p:cTn id="1" dur="indefinite" restart="never" nodeType="tmRoot">
           <p:childTnLst>
             <p:seq concurrent="1" nextAc="seek">
               <p:cTn id="2" dur="indefinite" nodeType="mainSeq">
@@ -8699,7 +8701,7 @@
   <p:timing>
     <p:tnLst>
       <p:par>
-        <p:cTn xmlns:p14="http://schemas.microsoft.com/office/powerpoint/2010/main" id="1" dur="indefinite" restart="never" nodeType="tmRoot">
+        <p:cTn id="1" dur="indefinite" restart="never" nodeType="tmRoot">
           <p:childTnLst>
             <p:seq concurrent="1" nextAc="seek">
               <p:cTn id="2" dur="indefinite" nodeType="mainSeq">
@@ -8929,7 +8931,7 @@
   <p:timing>
     <p:tnLst>
       <p:par>
-        <p:cTn xmlns:p14="http://schemas.microsoft.com/office/powerpoint/2010/main" id="1" dur="indefinite" restart="never" nodeType="tmRoot"/>
+        <p:cTn id="1" dur="indefinite" restart="never" nodeType="tmRoot"/>
       </p:par>
     </p:tnLst>
   </p:timing>
@@ -9130,7 +9132,7 @@
   <p:timing>
     <p:tnLst>
       <p:par>
-        <p:cTn xmlns:p14="http://schemas.microsoft.com/office/powerpoint/2010/main" id="1" dur="indefinite" restart="never" nodeType="tmRoot"/>
+        <p:cTn id="1" dur="indefinite" restart="never" nodeType="tmRoot"/>
       </p:par>
     </p:tnLst>
   </p:timing>
@@ -9209,7 +9211,7 @@
   <p:timing>
     <p:tnLst>
       <p:par>
-        <p:cTn xmlns:p14="http://schemas.microsoft.com/office/powerpoint/2010/main" id="1" dur="indefinite" restart="never" nodeType="tmRoot"/>
+        <p:cTn id="1" dur="indefinite" restart="never" nodeType="tmRoot"/>
       </p:par>
     </p:tnLst>
   </p:timing>
@@ -9900,7 +9902,7 @@
   <p:timing>
     <p:tnLst>
       <p:par>
-        <p:cTn xmlns:p14="http://schemas.microsoft.com/office/powerpoint/2010/main" id="1" dur="indefinite" restart="never" nodeType="tmRoot">
+        <p:cTn id="1" dur="indefinite" restart="never" nodeType="tmRoot">
           <p:childTnLst>
             <p:seq concurrent="1" nextAc="seek">
               <p:cTn id="2" dur="indefinite" nodeType="mainSeq">
@@ -10836,7 +10838,7 @@
   <p:timing>
     <p:tnLst>
       <p:par>
-        <p:cTn xmlns:p14="http://schemas.microsoft.com/office/powerpoint/2010/main" id="1" dur="indefinite" restart="never" nodeType="tmRoot">
+        <p:cTn id="1" dur="indefinite" restart="never" nodeType="tmRoot">
           <p:childTnLst>
             <p:seq concurrent="1" nextAc="seek">
               <p:cTn id="2" dur="indefinite" nodeType="mainSeq">
@@ -11093,7 +11095,7 @@
   <p:timing>
     <p:tnLst>
       <p:par>
-        <p:cTn xmlns:p14="http://schemas.microsoft.com/office/powerpoint/2010/main" id="1" dur="indefinite" restart="never" nodeType="tmRoot"/>
+        <p:cTn id="1" dur="indefinite" restart="never" nodeType="tmRoot"/>
       </p:par>
     </p:tnLst>
   </p:timing>
@@ -11793,7 +11795,7 @@
   <p:timing>
     <p:tnLst>
       <p:par>
-        <p:cTn xmlns:p14="http://schemas.microsoft.com/office/powerpoint/2010/main" id="1" dur="indefinite" restart="never" nodeType="tmRoot"/>
+        <p:cTn id="1" dur="indefinite" restart="never" nodeType="tmRoot"/>
       </p:par>
     </p:tnLst>
   </p:timing>
@@ -11952,7 +11954,7 @@
   <p:timing>
     <p:tnLst>
       <p:par>
-        <p:cTn xmlns:p14="http://schemas.microsoft.com/office/powerpoint/2010/main" id="1" dur="indefinite" restart="never" nodeType="tmRoot"/>
+        <p:cTn id="1" dur="indefinite" restart="never" nodeType="tmRoot"/>
       </p:par>
     </p:tnLst>
   </p:timing>
@@ -12031,7 +12033,7 @@
   <p:timing>
     <p:tnLst>
       <p:par>
-        <p:cTn xmlns:p14="http://schemas.microsoft.com/office/powerpoint/2010/main" id="1" dur="indefinite" restart="never" nodeType="tmRoot"/>
+        <p:cTn id="1" dur="indefinite" restart="never" nodeType="tmRoot"/>
       </p:par>
     </p:tnLst>
   </p:timing>
@@ -12728,7 +12730,7 @@
   <p:timing>
     <p:tnLst>
       <p:par>
-        <p:cTn xmlns:p14="http://schemas.microsoft.com/office/powerpoint/2010/main" id="1" dur="indefinite" restart="never" nodeType="tmRoot">
+        <p:cTn id="1" dur="indefinite" restart="never" nodeType="tmRoot">
           <p:childTnLst>
             <p:seq concurrent="1" nextAc="seek">
               <p:cTn id="2" dur="indefinite" nodeType="mainSeq">
@@ -13665,7 +13667,7 @@
   <p:timing>
     <p:tnLst>
       <p:par>
-        <p:cTn xmlns:p14="http://schemas.microsoft.com/office/powerpoint/2010/main" id="1" dur="indefinite" restart="never" nodeType="tmRoot">
+        <p:cTn id="1" dur="indefinite" restart="never" nodeType="tmRoot">
           <p:childTnLst>
             <p:seq concurrent="1" nextAc="seek">
               <p:cTn id="2" dur="indefinite" nodeType="mainSeq">
@@ -13896,7 +13898,7 @@
   <p:timing>
     <p:tnLst>
       <p:par>
-        <p:cTn xmlns:p14="http://schemas.microsoft.com/office/powerpoint/2010/main" id="1" dur="indefinite" restart="never" nodeType="tmRoot"/>
+        <p:cTn id="1" dur="indefinite" restart="never" nodeType="tmRoot"/>
       </p:par>
     </p:tnLst>
   </p:timing>
@@ -14733,7 +14735,7 @@
   <p:timing>
     <p:tnLst>
       <p:par>
-        <p:cTn xmlns:p14="http://schemas.microsoft.com/office/powerpoint/2010/main" id="1" dur="indefinite" restart="never" nodeType="tmRoot"/>
+        <p:cTn id="1" dur="indefinite" restart="never" nodeType="tmRoot"/>
       </p:par>
     </p:tnLst>
   </p:timing>
@@ -14919,7 +14921,7 @@
   <p:timing>
     <p:tnLst>
       <p:par>
-        <p:cTn xmlns:p14="http://schemas.microsoft.com/office/powerpoint/2010/main" id="1" dur="indefinite" restart="never" nodeType="tmRoot"/>
+        <p:cTn id="1" dur="indefinite" restart="never" nodeType="tmRoot"/>
       </p:par>
     </p:tnLst>
   </p:timing>
@@ -14998,7 +15000,7 @@
   <p:timing>
     <p:tnLst>
       <p:par>
-        <p:cTn xmlns:p14="http://schemas.microsoft.com/office/powerpoint/2010/main" id="1" dur="indefinite" restart="never" nodeType="tmRoot"/>
+        <p:cTn id="1" dur="indefinite" restart="never" nodeType="tmRoot"/>
       </p:par>
     </p:tnLst>
   </p:timing>
@@ -16320,7 +16322,7 @@
   <p:timing>
     <p:tnLst>
       <p:par>
-        <p:cTn xmlns:p14="http://schemas.microsoft.com/office/powerpoint/2010/main" id="1" dur="indefinite" restart="never" nodeType="tmRoot">
+        <p:cTn id="1" dur="indefinite" restart="never" nodeType="tmRoot">
           <p:childTnLst>
             <p:seq concurrent="1" nextAc="seek">
               <p:cTn id="2" dur="indefinite" nodeType="mainSeq">
@@ -16602,7 +16604,7 @@
   <p:timing>
     <p:tnLst>
       <p:par>
-        <p:cTn xmlns:p14="http://schemas.microsoft.com/office/powerpoint/2010/main" id="1" dur="indefinite" restart="never" nodeType="tmRoot"/>
+        <p:cTn id="1" dur="indefinite" restart="never" nodeType="tmRoot"/>
       </p:par>
     </p:tnLst>
   </p:timing>
@@ -17514,7 +17516,7 @@
   <p:timing>
     <p:tnLst>
       <p:par>
-        <p:cTn xmlns:p14="http://schemas.microsoft.com/office/powerpoint/2010/main" id="1" dur="indefinite" restart="never" nodeType="tmRoot">
+        <p:cTn id="1" dur="indefinite" restart="never" nodeType="tmRoot">
           <p:childTnLst>
             <p:seq concurrent="1" nextAc="seek">
               <p:cTn id="2" dur="indefinite" nodeType="mainSeq">
@@ -17983,7 +17985,7 @@
   <p:timing>
     <p:tnLst>
       <p:par>
-        <p:cTn xmlns:p14="http://schemas.microsoft.com/office/powerpoint/2010/main" id="1" dur="indefinite" restart="never" nodeType="tmRoot"/>
+        <p:cTn id="1" dur="indefinite" restart="never" nodeType="tmRoot"/>
       </p:par>
     </p:tnLst>
   </p:timing>
@@ -19444,7 +19446,7 @@
   <p:timing>
     <p:tnLst>
       <p:par>
-        <p:cTn xmlns:p14="http://schemas.microsoft.com/office/powerpoint/2010/main" id="1" dur="indefinite" restart="never" nodeType="tmRoot"/>
+        <p:cTn id="1" dur="indefinite" restart="never" nodeType="tmRoot"/>
       </p:par>
     </p:tnLst>
   </p:timing>
@@ -19609,7 +19611,7 @@
   <p:timing>
     <p:tnLst>
       <p:par>
-        <p:cTn xmlns:p14="http://schemas.microsoft.com/office/powerpoint/2010/main" id="1" dur="indefinite" restart="never" nodeType="tmRoot"/>
+        <p:cTn id="1" dur="indefinite" restart="never" nodeType="tmRoot"/>
       </p:par>
     </p:tnLst>
   </p:timing>
@@ -20925,7 +20927,7 @@
   <p:timing>
     <p:tnLst>
       <p:par>
-        <p:cTn xmlns:p14="http://schemas.microsoft.com/office/powerpoint/2010/main" id="1" dur="indefinite" restart="never" nodeType="tmRoot"/>
+        <p:cTn id="1" dur="indefinite" restart="never" nodeType="tmRoot"/>
       </p:par>
     </p:tnLst>
   </p:timing>
@@ -21038,7 +21040,7 @@
   <p:timing>
     <p:tnLst>
       <p:par>
-        <p:cTn xmlns:p14="http://schemas.microsoft.com/office/powerpoint/2010/main" id="1" dur="indefinite" restart="never" nodeType="tmRoot"/>
+        <p:cTn id="1" dur="indefinite" restart="never" nodeType="tmRoot"/>
       </p:par>
     </p:tnLst>
   </p:timing>
@@ -21850,7 +21852,7 @@
   <p:timing>
     <p:tnLst>
       <p:par>
-        <p:cTn xmlns:p14="http://schemas.microsoft.com/office/powerpoint/2010/main" id="1" dur="indefinite" restart="never" nodeType="tmRoot">
+        <p:cTn id="1" dur="indefinite" restart="never" nodeType="tmRoot">
           <p:childTnLst>
             <p:seq concurrent="1" nextAc="seek">
               <p:cTn id="2" dur="indefinite" nodeType="mainSeq">
@@ -22602,7 +22604,7 @@
   <p:timing>
     <p:tnLst>
       <p:par>
-        <p:cTn xmlns:p14="http://schemas.microsoft.com/office/powerpoint/2010/main" id="1" dur="indefinite" restart="never" nodeType="tmRoot">
+        <p:cTn id="1" dur="indefinite" restart="never" nodeType="tmRoot">
           <p:childTnLst>
             <p:seq concurrent="1" nextAc="seek">
               <p:cTn id="2" dur="indefinite" nodeType="mainSeq">
@@ -23115,7 +23117,7 @@
   <p:timing>
     <p:tnLst>
       <p:par>
-        <p:cTn xmlns:p14="http://schemas.microsoft.com/office/powerpoint/2010/main" id="1" dur="indefinite" restart="never" nodeType="tmRoot"/>
+        <p:cTn id="1" dur="indefinite" restart="never" nodeType="tmRoot"/>
       </p:par>
     </p:tnLst>
   </p:timing>
@@ -23960,7 +23962,7 @@
   <p:timing>
     <p:tnLst>
       <p:par>
-        <p:cTn xmlns:p14="http://schemas.microsoft.com/office/powerpoint/2010/main" id="1" dur="indefinite" restart="never" nodeType="tmRoot"/>
+        <p:cTn id="1" dur="indefinite" restart="never" nodeType="tmRoot"/>
       </p:par>
     </p:tnLst>
   </p:timing>
@@ -24478,7 +24480,7 @@
   <p:timing>
     <p:tnLst>
       <p:par>
-        <p:cTn xmlns:p14="http://schemas.microsoft.com/office/powerpoint/2010/main" id="1" dur="indefinite" restart="never" nodeType="tmRoot"/>
+        <p:cTn id="1" dur="indefinite" restart="never" nodeType="tmRoot"/>
       </p:par>
     </p:tnLst>
   </p:timing>
@@ -24637,7 +24639,7 @@
   <p:timing>
     <p:tnLst>
       <p:par>
-        <p:cTn xmlns:p14="http://schemas.microsoft.com/office/powerpoint/2010/main" id="1" dur="indefinite" restart="never" nodeType="tmRoot"/>
+        <p:cTn id="1" dur="indefinite" restart="never" nodeType="tmRoot"/>
       </p:par>
     </p:tnLst>
   </p:timing>
@@ -24645,6 +24647,499 @@
 </file>
 
 <file path=ppt/slides/slide41.xml><?xml version="1.0" encoding="utf-8"?>
+<p:sld xmlns:a="http://schemas.openxmlformats.org/drawingml/2006/main" xmlns:r="http://schemas.openxmlformats.org/officeDocument/2006/relationships" xmlns:p="http://schemas.openxmlformats.org/presentationml/2006/main">
+  <p:cSld>
+    <p:spTree>
+      <p:nvGrpSpPr>
+        <p:cNvPr id="1" name=""/>
+        <p:cNvGrpSpPr/>
+        <p:nvPr/>
+      </p:nvGrpSpPr>
+      <p:grpSpPr>
+        <a:xfrm>
+          <a:off x="0" y="0"/>
+          <a:ext cx="0" cy="0"/>
+          <a:chOff x="0" y="0"/>
+          <a:chExt cx="0" cy="0"/>
+        </a:xfrm>
+      </p:grpSpPr>
+      <p:sp>
+        <p:nvSpPr>
+          <p:cNvPr id="4" name="Content Placeholder 3"/>
+          <p:cNvSpPr>
+            <a:spLocks noGrp="1"/>
+          </p:cNvSpPr>
+          <p:nvPr>
+            <p:ph idx="4294967295"/>
+          </p:nvPr>
+        </p:nvSpPr>
+        <p:spPr>
+          <a:xfrm>
+            <a:off x="584499" y="146555"/>
+            <a:ext cx="11033761" cy="4834236"/>
+          </a:xfrm>
+        </p:spPr>
+        <p:txBody>
+          <a:bodyPr>
+            <a:noAutofit/>
+          </a:bodyPr>
+          <a:lstStyle/>
+          <a:p>
+            <a:pPr algn="ctr">
+              <a:lnSpc>
+                <a:spcPct val="150000"/>
+              </a:lnSpc>
+            </a:pPr>
+            <a:r>
+              <a:rPr lang="en-US" sz="3200" i="1" spc="-50" dirty="0" smtClean="0"/>
+              <a:t>Use </a:t>
+            </a:r>
+            <a:r>
+              <a:rPr lang="en-US" sz="3200" i="1" spc="-50" dirty="0"/>
+              <a:t>variable </a:t>
+            </a:r>
+            <a:r>
+              <a:rPr lang="en-US" sz="3200" i="1" spc="-50" dirty="0" smtClean="0"/>
+              <a:t>values</a:t>
+            </a:r>
+          </a:p>
+          <a:p>
+            <a:pPr algn="ctr">
+              <a:lnSpc>
+                <a:spcPct val="150000"/>
+              </a:lnSpc>
+            </a:pPr>
+            <a:r>
+              <a:rPr lang="en-US" sz="3200" i="1" spc="-50" dirty="0" smtClean="0"/>
+              <a:t>Wrap bad exceptions</a:t>
+            </a:r>
+            <a:endParaRPr lang="en-US" sz="3200" i="1" spc="-50" dirty="0"/>
+          </a:p>
+          <a:p>
+            <a:pPr algn="ctr">
+              <a:lnSpc>
+                <a:spcPct val="150000"/>
+              </a:lnSpc>
+            </a:pPr>
+            <a:r>
+              <a:rPr lang="en-US" sz="3200" i="1" spc="-50" dirty="0" smtClean="0"/>
+              <a:t>Provide context</a:t>
+            </a:r>
+            <a:endParaRPr lang="en-US" sz="3200" i="1" spc="-50" dirty="0"/>
+          </a:p>
+          <a:p>
+            <a:pPr algn="ctr">
+              <a:lnSpc>
+                <a:spcPct val="150000"/>
+              </a:lnSpc>
+            </a:pPr>
+            <a:r>
+              <a:rPr lang="en-US" sz="3200" i="1" spc="-50" dirty="0" smtClean="0"/>
+              <a:t>Show runtime details</a:t>
+            </a:r>
+            <a:endParaRPr lang="en-US" sz="3200" i="1" spc="-50" dirty="0"/>
+          </a:p>
+          <a:p>
+            <a:pPr algn="ctr">
+              <a:lnSpc>
+                <a:spcPct val="150000"/>
+              </a:lnSpc>
+            </a:pPr>
+            <a:r>
+              <a:rPr lang="en-US" sz="3200" i="1" spc="-50" dirty="0" err="1" smtClean="0"/>
+              <a:t>tl;dr</a:t>
+            </a:r>
+            <a:r>
+              <a:rPr lang="en-US" sz="3200" i="1" spc="-50" dirty="0" smtClean="0"/>
+              <a:t> examples</a:t>
+            </a:r>
+          </a:p>
+          <a:p>
+            <a:pPr algn="ctr">
+              <a:lnSpc>
+                <a:spcPct val="150000"/>
+              </a:lnSpc>
+            </a:pPr>
+            <a:r>
+              <a:rPr lang="en-US" sz="3200" i="1" spc="-50" dirty="0" smtClean="0"/>
+              <a:t>Extra </a:t>
+            </a:r>
+            <a:r>
+              <a:rPr lang="en-US" sz="3200" i="1" spc="-50" dirty="0"/>
+              <a:t>i</a:t>
+            </a:r>
+            <a:r>
+              <a:rPr lang="en-US" sz="3200" i="1" spc="-50" dirty="0" smtClean="0"/>
+              <a:t>nformation</a:t>
+            </a:r>
+            <a:endParaRPr lang="en-US" sz="3200" i="1" spc="-50" dirty="0"/>
+          </a:p>
+          <a:p>
+            <a:pPr algn="ctr">
+              <a:lnSpc>
+                <a:spcPct val="150000"/>
+              </a:lnSpc>
+            </a:pPr>
+            <a:r>
+              <a:rPr lang="en-US" sz="3200" i="1" spc="-50" dirty="0" smtClean="0"/>
+              <a:t>Highlight </a:t>
+            </a:r>
+            <a:r>
+              <a:rPr lang="en-US" sz="3200" i="1" spc="-50" dirty="0"/>
+              <a:t>root </a:t>
+            </a:r>
+            <a:r>
+              <a:rPr lang="en-US" sz="3200" i="1" spc="-50" dirty="0" smtClean="0"/>
+              <a:t>causes</a:t>
+            </a:r>
+            <a:endParaRPr lang="en-US" sz="3200" i="1" spc="-50" dirty="0"/>
+          </a:p>
+        </p:txBody>
+      </p:sp>
+    </p:spTree>
+    <p:extLst>
+      <p:ext uri="{BB962C8B-B14F-4D97-AF65-F5344CB8AC3E}">
+        <p14:creationId xmlns:p14="http://schemas.microsoft.com/office/powerpoint/2010/main" val="2733477931"/>
+      </p:ext>
+    </p:extLst>
+  </p:cSld>
+  <p:clrMapOvr>
+    <a:masterClrMapping/>
+  </p:clrMapOvr>
+  <p:timing>
+    <p:tnLst>
+      <p:par>
+        <p:cTn id="1" dur="indefinite" restart="never" nodeType="tmRoot"/>
+      </p:par>
+    </p:tnLst>
+  </p:timing>
+</p:sld>
+</file>
+
+<file path=ppt/slides/slide42.xml><?xml version="1.0" encoding="utf-8"?>
+<p:sld xmlns:a="http://schemas.openxmlformats.org/drawingml/2006/main" xmlns:r="http://schemas.openxmlformats.org/officeDocument/2006/relationships" xmlns:p="http://schemas.openxmlformats.org/presentationml/2006/main">
+  <p:cSld>
+    <p:spTree>
+      <p:nvGrpSpPr>
+        <p:cNvPr id="1" name=""/>
+        <p:cNvGrpSpPr/>
+        <p:nvPr/>
+      </p:nvGrpSpPr>
+      <p:grpSpPr>
+        <a:xfrm>
+          <a:off x="0" y="0"/>
+          <a:ext cx="0" cy="0"/>
+          <a:chOff x="0" y="0"/>
+          <a:chExt cx="0" cy="0"/>
+        </a:xfrm>
+      </p:grpSpPr>
+      <p:graphicFrame>
+        <p:nvGraphicFramePr>
+          <p:cNvPr id="2" name="Table 1"/>
+          <p:cNvGraphicFramePr>
+            <a:graphicFrameLocks noGrp="1"/>
+          </p:cNvGraphicFramePr>
+          <p:nvPr>
+            <p:extLst>
+              <p:ext uri="{D42A27DB-BD31-4B8C-83A1-F6EECF244321}">
+                <p14:modId xmlns:p14="http://schemas.microsoft.com/office/powerpoint/2010/main" val="3509913423"/>
+              </p:ext>
+            </p:extLst>
+          </p:nvPr>
+        </p:nvGraphicFramePr>
+        <p:xfrm>
+          <a:off x="-2" y="2"/>
+          <a:ext cx="12192005" cy="6293222"/>
+        </p:xfrm>
+        <a:graphic>
+          <a:graphicData uri="http://schemas.openxmlformats.org/drawingml/2006/table">
+            <a:tbl>
+              <a:tblPr firstRow="1" bandRow="1">
+                <a:tableStyleId>{5940675A-B579-460E-94D1-54222C63F5DA}</a:tableStyleId>
+              </a:tblPr>
+              <a:tblGrid>
+                <a:gridCol w="1741715"/>
+                <a:gridCol w="1741715"/>
+                <a:gridCol w="1741715"/>
+                <a:gridCol w="1741715"/>
+                <a:gridCol w="1741715"/>
+                <a:gridCol w="1741715"/>
+                <a:gridCol w="1741715"/>
+              </a:tblGrid>
+              <a:tr h="3035030">
+                <a:tc>
+                  <a:txBody>
+                    <a:bodyPr/>
+                    <a:lstStyle/>
+                    <a:p>
+                      <a:r>
+                        <a:rPr lang="en-US" dirty="0" smtClean="0"/>
+                        <a:t>Your options are</a:t>
+                      </a:r>
+                      <a:endParaRPr lang="en-US" dirty="0"/>
+                    </a:p>
+                  </a:txBody>
+                  <a:tcPr/>
+                </a:tc>
+                <a:tc>
+                  <a:txBody>
+                    <a:bodyPr/>
+                    <a:lstStyle/>
+                    <a:p>
+                      <a:r>
+                        <a:rPr lang="en-US" dirty="0" smtClean="0"/>
+                        <a:t>How can you make this exceptional?</a:t>
+                      </a:r>
+                      <a:endParaRPr lang="en-US" dirty="0"/>
+                    </a:p>
+                  </a:txBody>
+                  <a:tcPr/>
+                </a:tc>
+                <a:tc>
+                  <a:txBody>
+                    <a:bodyPr/>
+                    <a:lstStyle/>
+                    <a:p>
+                      <a:r>
+                        <a:rPr lang="en-US" dirty="0" smtClean="0"/>
+                        <a:t>Show me the</a:t>
+                      </a:r>
+                      <a:r>
+                        <a:rPr lang="en-US" baseline="0" dirty="0" smtClean="0"/>
+                        <a:t> code</a:t>
+                      </a:r>
+                      <a:endParaRPr lang="en-US" dirty="0"/>
+                    </a:p>
+                  </a:txBody>
+                  <a:tcPr/>
+                </a:tc>
+                <a:tc>
+                  <a:txBody>
+                    <a:bodyPr/>
+                    <a:lstStyle/>
+                    <a:p>
+                      <a:r>
+                        <a:rPr lang="en-US" dirty="0" smtClean="0"/>
+                        <a:t>Lets ask</a:t>
+                      </a:r>
+                      <a:r>
+                        <a:rPr lang="en-US" baseline="0" dirty="0" smtClean="0"/>
+                        <a:t> our studio audience</a:t>
+                      </a:r>
+                      <a:endParaRPr lang="en-US" dirty="0"/>
+                    </a:p>
+                  </a:txBody>
+                  <a:tcPr/>
+                </a:tc>
+                <a:tc>
+                  <a:txBody>
+                    <a:bodyPr/>
+                    <a:lstStyle/>
+                    <a:p>
+                      <a:r>
+                        <a:rPr lang="en-US" dirty="0" smtClean="0"/>
+                        <a:t>Prove to me that you can do this</a:t>
+                      </a:r>
+                      <a:r>
+                        <a:rPr lang="en-US" baseline="0" dirty="0" smtClean="0"/>
+                        <a:t> in code</a:t>
+                      </a:r>
+                      <a:endParaRPr lang="en-US" dirty="0"/>
+                    </a:p>
+                  </a:txBody>
+                  <a:tcPr/>
+                </a:tc>
+                <a:tc>
+                  <a:txBody>
+                    <a:bodyPr/>
+                    <a:lstStyle/>
+                    <a:p>
+                      <a:r>
+                        <a:rPr lang="en-US" dirty="0" smtClean="0"/>
+                        <a:t>Lets go back in time</a:t>
+                      </a:r>
+                      <a:endParaRPr lang="en-US" dirty="0"/>
+                    </a:p>
+                  </a:txBody>
+                  <a:tcPr/>
+                </a:tc>
+                <a:tc>
+                  <a:txBody>
+                    <a:bodyPr/>
+                    <a:lstStyle/>
+                    <a:p>
+                      <a:r>
+                        <a:rPr lang="en-US" dirty="0" smtClean="0"/>
+                        <a:t>What am I supposed to learn from this?</a:t>
+                      </a:r>
+                      <a:endParaRPr lang="en-US" dirty="0"/>
+                    </a:p>
+                  </a:txBody>
+                  <a:tcPr/>
+                </a:tc>
+              </a:tr>
+              <a:tr h="1629096">
+                <a:tc>
+                  <a:txBody>
+                    <a:bodyPr/>
+                    <a:lstStyle/>
+                    <a:p>
+                      <a:endParaRPr lang="en-US" dirty="0"/>
+                    </a:p>
+                  </a:txBody>
+                  <a:tcPr/>
+                </a:tc>
+                <a:tc>
+                  <a:txBody>
+                    <a:bodyPr/>
+                    <a:lstStyle/>
+                    <a:p>
+                      <a:endParaRPr lang="en-US"/>
+                    </a:p>
+                  </a:txBody>
+                  <a:tcPr/>
+                </a:tc>
+                <a:tc>
+                  <a:txBody>
+                    <a:bodyPr/>
+                    <a:lstStyle/>
+                    <a:p>
+                      <a:endParaRPr lang="en-US"/>
+                    </a:p>
+                  </a:txBody>
+                  <a:tcPr/>
+                </a:tc>
+                <a:tc>
+                  <a:txBody>
+                    <a:bodyPr/>
+                    <a:lstStyle/>
+                    <a:p>
+                      <a:endParaRPr lang="en-US"/>
+                    </a:p>
+                  </a:txBody>
+                  <a:tcPr/>
+                </a:tc>
+                <a:tc>
+                  <a:txBody>
+                    <a:bodyPr/>
+                    <a:lstStyle/>
+                    <a:p>
+                      <a:endParaRPr lang="en-US"/>
+                    </a:p>
+                  </a:txBody>
+                  <a:tcPr/>
+                </a:tc>
+                <a:tc>
+                  <a:txBody>
+                    <a:bodyPr/>
+                    <a:lstStyle/>
+                    <a:p>
+                      <a:endParaRPr lang="en-US"/>
+                    </a:p>
+                  </a:txBody>
+                  <a:tcPr/>
+                </a:tc>
+                <a:tc>
+                  <a:txBody>
+                    <a:bodyPr/>
+                    <a:lstStyle/>
+                    <a:p>
+                      <a:endParaRPr lang="en-US"/>
+                    </a:p>
+                  </a:txBody>
+                  <a:tcPr/>
+                </a:tc>
+              </a:tr>
+              <a:tr h="1629096">
+                <a:tc>
+                  <a:txBody>
+                    <a:bodyPr/>
+                    <a:lstStyle/>
+                    <a:p>
+                      <a:endParaRPr lang="en-US"/>
+                    </a:p>
+                  </a:txBody>
+                  <a:tcPr/>
+                </a:tc>
+                <a:tc>
+                  <a:txBody>
+                    <a:bodyPr/>
+                    <a:lstStyle/>
+                    <a:p>
+                      <a:endParaRPr lang="en-US"/>
+                    </a:p>
+                  </a:txBody>
+                  <a:tcPr/>
+                </a:tc>
+                <a:tc>
+                  <a:txBody>
+                    <a:bodyPr/>
+                    <a:lstStyle/>
+                    <a:p>
+                      <a:endParaRPr lang="en-US"/>
+                    </a:p>
+                  </a:txBody>
+                  <a:tcPr/>
+                </a:tc>
+                <a:tc>
+                  <a:txBody>
+                    <a:bodyPr/>
+                    <a:lstStyle/>
+                    <a:p>
+                      <a:endParaRPr lang="en-US"/>
+                    </a:p>
+                  </a:txBody>
+                  <a:tcPr/>
+                </a:tc>
+                <a:tc>
+                  <a:txBody>
+                    <a:bodyPr/>
+                    <a:lstStyle/>
+                    <a:p>
+                      <a:endParaRPr lang="en-US"/>
+                    </a:p>
+                  </a:txBody>
+                  <a:tcPr/>
+                </a:tc>
+                <a:tc>
+                  <a:txBody>
+                    <a:bodyPr/>
+                    <a:lstStyle/>
+                    <a:p>
+                      <a:endParaRPr lang="en-US"/>
+                    </a:p>
+                  </a:txBody>
+                  <a:tcPr/>
+                </a:tc>
+                <a:tc>
+                  <a:txBody>
+                    <a:bodyPr/>
+                    <a:lstStyle/>
+                    <a:p>
+                      <a:endParaRPr lang="en-US" dirty="0"/>
+                    </a:p>
+                  </a:txBody>
+                  <a:tcPr/>
+                </a:tc>
+              </a:tr>
+            </a:tbl>
+          </a:graphicData>
+        </a:graphic>
+      </p:graphicFrame>
+    </p:spTree>
+    <p:extLst>
+      <p:ext uri="{BB962C8B-B14F-4D97-AF65-F5344CB8AC3E}">
+        <p14:creationId xmlns:p14="http://schemas.microsoft.com/office/powerpoint/2010/main" val="2197892280"/>
+      </p:ext>
+    </p:extLst>
+  </p:cSld>
+  <p:clrMapOvr>
+    <a:masterClrMapping/>
+  </p:clrMapOvr>
+</p:sld>
+</file>
+
+<file path=ppt/slides/slide43.xml><?xml version="1.0" encoding="utf-8"?>
 <p:sld xmlns:a="http://schemas.openxmlformats.org/drawingml/2006/main" xmlns:r="http://schemas.openxmlformats.org/officeDocument/2006/relationships" xmlns:p="http://schemas.openxmlformats.org/presentationml/2006/main">
   <p:cSld>
     <p:spTree>
@@ -24853,14 +25348,14 @@
   <p:timing>
     <p:tnLst>
       <p:par>
-        <p:cTn xmlns:p14="http://schemas.microsoft.com/office/powerpoint/2010/main" id="1" dur="indefinite" restart="never" nodeType="tmRoot"/>
+        <p:cTn id="1" dur="indefinite" restart="never" nodeType="tmRoot"/>
       </p:par>
     </p:tnLst>
   </p:timing>
 </p:sld>
 </file>
 
-<file path=ppt/slides/slide42.xml><?xml version="1.0" encoding="utf-8"?>
+<file path=ppt/slides/slide44.xml><?xml version="1.0" encoding="utf-8"?>
 <p:sld xmlns:a="http://schemas.openxmlformats.org/drawingml/2006/main" xmlns:r="http://schemas.openxmlformats.org/officeDocument/2006/relationships" xmlns:p="http://schemas.openxmlformats.org/presentationml/2006/main">
   <p:cSld>
     <p:spTree>
@@ -24920,14 +25415,14 @@
   <p:timing>
     <p:tnLst>
       <p:par>
-        <p:cTn xmlns:p14="http://schemas.microsoft.com/office/powerpoint/2010/main" id="1" dur="indefinite" restart="never" nodeType="tmRoot"/>
+        <p:cTn id="1" dur="indefinite" restart="never" nodeType="tmRoot"/>
       </p:par>
     </p:tnLst>
   </p:timing>
 </p:sld>
 </file>
 
-<file path=ppt/slides/slide43.xml><?xml version="1.0" encoding="utf-8"?>
+<file path=ppt/slides/slide45.xml><?xml version="1.0" encoding="utf-8"?>
 <p:sld xmlns:a="http://schemas.openxmlformats.org/drawingml/2006/main" xmlns:r="http://schemas.openxmlformats.org/officeDocument/2006/relationships" xmlns:p="http://schemas.openxmlformats.org/presentationml/2006/main">
   <p:cSld>
     <p:spTree>
@@ -25332,14 +25827,14 @@
   <p:timing>
     <p:tnLst>
       <p:par>
-        <p:cTn xmlns:p14="http://schemas.microsoft.com/office/powerpoint/2010/main" id="1" dur="indefinite" restart="never" nodeType="tmRoot"/>
+        <p:cTn id="1" dur="indefinite" restart="never" nodeType="tmRoot"/>
       </p:par>
     </p:tnLst>
   </p:timing>
 </p:sld>
 </file>
 
-<file path=ppt/slides/slide44.xml><?xml version="1.0" encoding="utf-8"?>
+<file path=ppt/slides/slide46.xml><?xml version="1.0" encoding="utf-8"?>
 <p:sld xmlns:a="http://schemas.openxmlformats.org/drawingml/2006/main" xmlns:r="http://schemas.openxmlformats.org/officeDocument/2006/relationships" xmlns:p="http://schemas.openxmlformats.org/presentationml/2006/main">
   <p:cSld>
     <p:spTree>
@@ -25749,14 +26244,14 @@
           </a:effectLst>
           <a:extLst>
             <a:ext uri="{909E8E84-426E-40dd-AFC4-6F175D3DCCD1}">
-              <a14:hiddenFill xmlns:a14="http://schemas.microsoft.com/office/drawing/2010/main">
+              <a14:hiddenFill xmlns:a14="http://schemas.microsoft.com/office/drawing/2010/main" xmlns="">
                 <a:solidFill>
                   <a:schemeClr val="accent1"/>
                 </a:solidFill>
               </a14:hiddenFill>
             </a:ext>
             <a:ext uri="{91240B29-F687-4f45-9708-019B960494DF}">
-              <a14:hiddenLine xmlns:a14="http://schemas.microsoft.com/office/drawing/2010/main" w="9525">
+              <a14:hiddenLine xmlns:a14="http://schemas.microsoft.com/office/drawing/2010/main" xmlns="" w="9525">
                 <a:solidFill>
                   <a:schemeClr val="tx1"/>
                 </a:solidFill>
@@ -26183,14 +26678,14 @@
   <p:timing>
     <p:tnLst>
       <p:par>
-        <p:cTn xmlns:p14="http://schemas.microsoft.com/office/powerpoint/2010/main" id="1" dur="indefinite" restart="never" nodeType="tmRoot"/>
+        <p:cTn id="1" dur="indefinite" restart="never" nodeType="tmRoot"/>
       </p:par>
     </p:tnLst>
   </p:timing>
 </p:sld>
 </file>
 
-<file path=ppt/slides/slide45.xml><?xml version="1.0" encoding="utf-8"?>
+<file path=ppt/slides/slide47.xml><?xml version="1.0" encoding="utf-8"?>
 <p:sld xmlns:a="http://schemas.openxmlformats.org/drawingml/2006/main" xmlns:r="http://schemas.openxmlformats.org/officeDocument/2006/relationships" xmlns:p="http://schemas.openxmlformats.org/presentationml/2006/main" show="0">
   <p:cSld>
     <p:spTree>
@@ -26371,25 +26866,25 @@
   <p:clrMapOvr>
     <a:masterClrMapping/>
   </p:clrMapOvr>
-  <mc:AlternateContent xmlns:mc="http://schemas.openxmlformats.org/markup-compatibility/2006">
-    <mc:Choice xmlns:p14="http://schemas.microsoft.com/office/powerpoint/2010/main" Requires="p14">
+  <mc:AlternateContent xmlns:mc="http://schemas.openxmlformats.org/markup-compatibility/2006" xmlns:p14="http://schemas.microsoft.com/office/powerpoint/2010/main">
+    <mc:Choice Requires="p14">
       <p:transition spd="slow" p14:dur="2000"/>
     </mc:Choice>
-    <mc:Fallback>
+    <mc:Fallback xmlns="">
       <p:transition xmlns:p14="http://schemas.microsoft.com/office/powerpoint/2010/main" spd="slow"/>
     </mc:Fallback>
   </mc:AlternateContent>
   <p:timing>
     <p:tnLst>
       <p:par>
-        <p:cTn xmlns:p14="http://schemas.microsoft.com/office/powerpoint/2010/main" id="1" dur="indefinite" restart="never" nodeType="tmRoot"/>
+        <p:cTn id="1" dur="indefinite" restart="never" nodeType="tmRoot"/>
       </p:par>
     </p:tnLst>
   </p:timing>
 </p:sld>
 </file>
 
-<file path=ppt/slides/slide46.xml><?xml version="1.0" encoding="utf-8"?>
+<file path=ppt/slides/slide48.xml><?xml version="1.0" encoding="utf-8"?>
 <p:sld xmlns:a="http://schemas.openxmlformats.org/drawingml/2006/main" xmlns:r="http://schemas.openxmlformats.org/officeDocument/2006/relationships" xmlns:p="http://schemas.openxmlformats.org/presentationml/2006/main" show="0">
   <p:cSld>
     <p:spTree>
@@ -26538,18 +27033,18 @@
   <p:clrMapOvr>
     <a:masterClrMapping/>
   </p:clrMapOvr>
-  <mc:AlternateContent xmlns:mc="http://schemas.openxmlformats.org/markup-compatibility/2006">
-    <mc:Choice xmlns:p14="http://schemas.microsoft.com/office/powerpoint/2010/main" Requires="p14">
+  <mc:AlternateContent xmlns:mc="http://schemas.openxmlformats.org/markup-compatibility/2006" xmlns:p14="http://schemas.microsoft.com/office/powerpoint/2010/main">
+    <mc:Choice Requires="p14">
       <p:transition spd="slow" p14:dur="2000"/>
     </mc:Choice>
-    <mc:Fallback>
+    <mc:Fallback xmlns="">
       <p:transition xmlns:p14="http://schemas.microsoft.com/office/powerpoint/2010/main" spd="slow"/>
     </mc:Fallback>
   </mc:AlternateContent>
   <p:timing>
     <p:tnLst>
       <p:par>
-        <p:cTn xmlns:p14="http://schemas.microsoft.com/office/powerpoint/2010/main" id="1" dur="indefinite" restart="never" nodeType="tmRoot"/>
+        <p:cTn id="1" dur="indefinite" restart="never" nodeType="tmRoot"/>
       </p:par>
     </p:tnLst>
   </p:timing>
@@ -26675,18 +27170,18 @@
   <p:clrMapOvr>
     <a:masterClrMapping/>
   </p:clrMapOvr>
-  <mc:AlternateContent xmlns:mc="http://schemas.openxmlformats.org/markup-compatibility/2006">
-    <mc:Choice xmlns:p14="http://schemas.microsoft.com/office/powerpoint/2010/main" Requires="p14">
+  <mc:AlternateContent xmlns:mc="http://schemas.openxmlformats.org/markup-compatibility/2006" xmlns:p14="http://schemas.microsoft.com/office/powerpoint/2010/main">
+    <mc:Choice Requires="p14">
       <p:transition spd="slow" p14:dur="2000"/>
     </mc:Choice>
-    <mc:Fallback>
+    <mc:Fallback xmlns="">
       <p:transition xmlns:p14="http://schemas.microsoft.com/office/powerpoint/2010/main" spd="slow"/>
     </mc:Fallback>
   </mc:AlternateContent>
   <p:timing>
     <p:tnLst>
       <p:par>
-        <p:cTn xmlns:p14="http://schemas.microsoft.com/office/powerpoint/2010/main" id="1" dur="indefinite" restart="never" nodeType="tmRoot"/>
+        <p:cTn id="1" dur="indefinite" restart="never" nodeType="tmRoot"/>
       </p:par>
     </p:tnLst>
   </p:timing>
@@ -26765,7 +27260,7 @@
   <p:timing>
     <p:tnLst>
       <p:par>
-        <p:cTn xmlns:p14="http://schemas.microsoft.com/office/powerpoint/2010/main" id="1" dur="indefinite" restart="never" nodeType="tmRoot"/>
+        <p:cTn id="1" dur="indefinite" restart="never" nodeType="tmRoot"/>
       </p:par>
     </p:tnLst>
   </p:timing>
@@ -27532,7 +28027,7 @@
   <p:timing>
     <p:tnLst>
       <p:par>
-        <p:cTn xmlns:p14="http://schemas.microsoft.com/office/powerpoint/2010/main" id="1" dur="indefinite" restart="never" nodeType="tmRoot">
+        <p:cTn id="1" dur="indefinite" restart="never" nodeType="tmRoot">
           <p:childTnLst>
             <p:seq concurrent="1" nextAc="seek">
               <p:cTn id="2" dur="indefinite" nodeType="mainSeq">
@@ -28420,7 +28915,7 @@
   <p:timing>
     <p:tnLst>
       <p:par>
-        <p:cTn xmlns:p14="http://schemas.microsoft.com/office/powerpoint/2010/main" id="1" dur="indefinite" restart="never" nodeType="tmRoot">
+        <p:cTn id="1" dur="indefinite" restart="never" nodeType="tmRoot">
           <p:childTnLst>
             <p:seq concurrent="1" nextAc="seek">
               <p:cTn id="2" dur="indefinite" nodeType="mainSeq">
@@ -29408,7 +29903,7 @@
   <p:timing>
     <p:tnLst>
       <p:par>
-        <p:cTn xmlns:p14="http://schemas.microsoft.com/office/powerpoint/2010/main" id="1" dur="indefinite" restart="never" nodeType="tmRoot"/>
+        <p:cTn id="1" dur="indefinite" restart="never" nodeType="tmRoot"/>
       </p:par>
     </p:tnLst>
   </p:timing>
@@ -29692,7 +30187,7 @@
   <a:extraClrSchemeLst/>
   <a:extLst>
     <a:ext uri="{05A4C25C-085E-4340-85A3-A5531E510DB2}">
-      <thm15:themeFamily xmlns:thm15="http://schemas.microsoft.com/office/thememl/2012/main" xmlns="" name="Retrospect" id="{5F128B03-DCCA-4EEB-AB3B-CF2899314A46}" vid="{9CC26709-368C-4D72-9060-94E5B3FF3CD6}"/>
+      <thm15:themeFamily xmlns:thm15="http://schemas.microsoft.com/office/thememl/2012/main" name="Retrospect" id="{5F128B03-DCCA-4EEB-AB3B-CF2899314A46}" vid="{9CC26709-368C-4D72-9060-94E5B3FF3CD6}"/>
     </a:ext>
   </a:extLst>
 </a:theme>

</xml_diff>